<commit_message>
Draft version for OpenStack and AWS integration
</commit_message>
<xml_diff>
--- a/Development/DocSources/en/AWSIntegrationGuide/_images/images.pptx
+++ b/Development/DocSources/en/AWSIntegrationGuide/_images/images.pptx
@@ -6,6 +6,7 @@
   </p:sldMasterIdLst>
   <p:sldIdLst>
     <p:sldId id="256" r:id="rId2"/>
+    <p:sldId id="257" r:id="rId3"/>
   </p:sldIdLst>
   <p:sldSz cx="6858000" cy="9144000" type="screen4x3"/>
   <p:notesSz cx="6858000" cy="9144000"/>
@@ -104,6 +105,22 @@
       </a:defRPr>
     </a:lvl9pPr>
   </p:defaultTextStyle>
+  <p:extLst>
+    <p:ext uri="{EFAFB233-063F-42B5-8137-9DF3F51BA10A}">
+      <p15:sldGuideLst xmlns:p15="http://schemas.microsoft.com/office/powerpoint/2012/main">
+        <p15:guide id="1" orient="horz" pos="2880">
+          <p15:clr>
+            <a:srgbClr val="A4A3A4"/>
+          </p15:clr>
+        </p15:guide>
+        <p15:guide id="2" pos="2160">
+          <p15:clr>
+            <a:srgbClr val="A4A3A4"/>
+          </p15:clr>
+        </p15:guide>
+      </p15:sldGuideLst>
+    </p:ext>
+  </p:extLst>
 </p:presentation>
 </file>
 
@@ -288,7 +305,7 @@
           <a:p>
             <a:fld id="{DDD501E0-58CF-4A9F-A444-8A0230425944}" type="datetimeFigureOut">
               <a:rPr lang="de-DE" smtClean="0"/>
-              <a:t>06.10.2015</a:t>
+              <a:t>18.12.2017</a:t>
             </a:fld>
             <a:endParaRPr lang="de-DE"/>
           </a:p>
@@ -458,7 +475,7 @@
           <a:p>
             <a:fld id="{DDD501E0-58CF-4A9F-A444-8A0230425944}" type="datetimeFigureOut">
               <a:rPr lang="de-DE" smtClean="0"/>
-              <a:t>06.10.2015</a:t>
+              <a:t>18.12.2017</a:t>
             </a:fld>
             <a:endParaRPr lang="de-DE"/>
           </a:p>
@@ -638,7 +655,7 @@
           <a:p>
             <a:fld id="{DDD501E0-58CF-4A9F-A444-8A0230425944}" type="datetimeFigureOut">
               <a:rPr lang="de-DE" smtClean="0"/>
-              <a:t>06.10.2015</a:t>
+              <a:t>18.12.2017</a:t>
             </a:fld>
             <a:endParaRPr lang="de-DE"/>
           </a:p>
@@ -808,7 +825,7 @@
           <a:p>
             <a:fld id="{DDD501E0-58CF-4A9F-A444-8A0230425944}" type="datetimeFigureOut">
               <a:rPr lang="de-DE" smtClean="0"/>
-              <a:t>06.10.2015</a:t>
+              <a:t>18.12.2017</a:t>
             </a:fld>
             <a:endParaRPr lang="de-DE"/>
           </a:p>
@@ -1054,7 +1071,7 @@
           <a:p>
             <a:fld id="{DDD501E0-58CF-4A9F-A444-8A0230425944}" type="datetimeFigureOut">
               <a:rPr lang="de-DE" smtClean="0"/>
-              <a:t>06.10.2015</a:t>
+              <a:t>18.12.2017</a:t>
             </a:fld>
             <a:endParaRPr lang="de-DE"/>
           </a:p>
@@ -1342,7 +1359,7 @@
           <a:p>
             <a:fld id="{DDD501E0-58CF-4A9F-A444-8A0230425944}" type="datetimeFigureOut">
               <a:rPr lang="de-DE" smtClean="0"/>
-              <a:t>06.10.2015</a:t>
+              <a:t>18.12.2017</a:t>
             </a:fld>
             <a:endParaRPr lang="de-DE"/>
           </a:p>
@@ -1764,7 +1781,7 @@
           <a:p>
             <a:fld id="{DDD501E0-58CF-4A9F-A444-8A0230425944}" type="datetimeFigureOut">
               <a:rPr lang="de-DE" smtClean="0"/>
-              <a:t>06.10.2015</a:t>
+              <a:t>18.12.2017</a:t>
             </a:fld>
             <a:endParaRPr lang="de-DE"/>
           </a:p>
@@ -1882,7 +1899,7 @@
           <a:p>
             <a:fld id="{DDD501E0-58CF-4A9F-A444-8A0230425944}" type="datetimeFigureOut">
               <a:rPr lang="de-DE" smtClean="0"/>
-              <a:t>06.10.2015</a:t>
+              <a:t>18.12.2017</a:t>
             </a:fld>
             <a:endParaRPr lang="de-DE"/>
           </a:p>
@@ -1977,7 +1994,7 @@
           <a:p>
             <a:fld id="{DDD501E0-58CF-4A9F-A444-8A0230425944}" type="datetimeFigureOut">
               <a:rPr lang="de-DE" smtClean="0"/>
-              <a:t>06.10.2015</a:t>
+              <a:t>18.12.2017</a:t>
             </a:fld>
             <a:endParaRPr lang="de-DE"/>
           </a:p>
@@ -2254,7 +2271,7 @@
           <a:p>
             <a:fld id="{DDD501E0-58CF-4A9F-A444-8A0230425944}" type="datetimeFigureOut">
               <a:rPr lang="de-DE" smtClean="0"/>
-              <a:t>06.10.2015</a:t>
+              <a:t>18.12.2017</a:t>
             </a:fld>
             <a:endParaRPr lang="de-DE"/>
           </a:p>
@@ -2507,7 +2524,7 @@
           <a:p>
             <a:fld id="{DDD501E0-58CF-4A9F-A444-8A0230425944}" type="datetimeFigureOut">
               <a:rPr lang="de-DE" smtClean="0"/>
-              <a:t>06.10.2015</a:t>
+              <a:t>18.12.2017</a:t>
             </a:fld>
             <a:endParaRPr lang="de-DE"/>
           </a:p>
@@ -2720,7 +2737,7 @@
           <a:p>
             <a:fld id="{DDD501E0-58CF-4A9F-A444-8A0230425944}" type="datetimeFigureOut">
               <a:rPr lang="de-DE" smtClean="0"/>
-              <a:t>06.10.2015</a:t>
+              <a:t>18.12.2017</a:t>
             </a:fld>
             <a:endParaRPr lang="de-DE"/>
           </a:p>
@@ -3955,7 +3972,7 @@
                   <a:latin typeface="Arial" panose="020B0604020202020204" pitchFamily="34" charset="0"/>
                   <a:cs typeface="Arial" panose="020B0604020202020204" pitchFamily="34" charset="0"/>
                 </a:rPr>
-                <a:t>Catalog Manager</a:t>
+                <a:t>ESCM</a:t>
               </a:r>
               <a:endParaRPr lang="de-DE" sz="1200" b="1" dirty="0">
                 <a:latin typeface="Arial" panose="020B0604020202020204" pitchFamily="34" charset="0"/>
@@ -4896,6 +4913,1840 @@
     <p:extLst>
       <p:ext uri="{BB962C8B-B14F-4D97-AF65-F5344CB8AC3E}">
         <p14:creationId xmlns:p14="http://schemas.microsoft.com/office/powerpoint/2010/main" val="2262136484"/>
+      </p:ext>
+    </p:extLst>
+  </p:cSld>
+  <p:clrMapOvr>
+    <a:masterClrMapping/>
+  </p:clrMapOvr>
+  <p:timing>
+    <p:tnLst>
+      <p:par>
+        <p:cTn id="1" dur="indefinite" restart="never" nodeType="tmRoot"/>
+      </p:par>
+    </p:tnLst>
+  </p:timing>
+</p:sld>
+</file>
+
+<file path=ppt/slides/slide2.xml><?xml version="1.0" encoding="utf-8"?>
+<p:sld xmlns:a="http://schemas.openxmlformats.org/drawingml/2006/main" xmlns:r="http://schemas.openxmlformats.org/officeDocument/2006/relationships" xmlns:p="http://schemas.openxmlformats.org/presentationml/2006/main">
+  <p:cSld>
+    <p:spTree>
+      <p:nvGrpSpPr>
+        <p:cNvPr id="1" name=""/>
+        <p:cNvGrpSpPr/>
+        <p:nvPr/>
+      </p:nvGrpSpPr>
+      <p:grpSpPr>
+        <a:xfrm>
+          <a:off x="0" y="0"/>
+          <a:ext cx="0" cy="0"/>
+          <a:chOff x="0" y="0"/>
+          <a:chExt cx="0" cy="0"/>
+        </a:xfrm>
+      </p:grpSpPr>
+      <p:grpSp>
+        <p:nvGrpSpPr>
+          <p:cNvPr id="2" name="Group 1"/>
+          <p:cNvGrpSpPr/>
+          <p:nvPr/>
+        </p:nvGrpSpPr>
+        <p:grpSpPr>
+          <a:xfrm>
+            <a:off x="728700" y="611560"/>
+            <a:ext cx="5400600" cy="2293223"/>
+            <a:chOff x="728700" y="611560"/>
+            <a:chExt cx="5400600" cy="2293223"/>
+          </a:xfrm>
+        </p:grpSpPr>
+        <p:sp>
+          <p:nvSpPr>
+            <p:cNvPr id="18" name="Rounded Rectangle 17"/>
+            <p:cNvSpPr/>
+            <p:nvPr/>
+          </p:nvSpPr>
+          <p:spPr>
+            <a:xfrm>
+              <a:off x="728700" y="611560"/>
+              <a:ext cx="2862448" cy="2293223"/>
+            </a:xfrm>
+            <a:prstGeom prst="roundRect">
+              <a:avLst/>
+            </a:prstGeom>
+            <a:noFill/>
+            <a:ln w="31750">
+              <a:solidFill>
+                <a:srgbClr val="C00000"/>
+              </a:solidFill>
+              <a:prstDash val="solid"/>
+            </a:ln>
+          </p:spPr>
+          <p:style>
+            <a:lnRef idx="2">
+              <a:schemeClr val="accent1">
+                <a:shade val="50000"/>
+              </a:schemeClr>
+            </a:lnRef>
+            <a:fillRef idx="1">
+              <a:schemeClr val="accent1"/>
+            </a:fillRef>
+            <a:effectRef idx="0">
+              <a:schemeClr val="accent1"/>
+            </a:effectRef>
+            <a:fontRef idx="minor">
+              <a:schemeClr val="lt1"/>
+            </a:fontRef>
+          </p:style>
+          <p:txBody>
+            <a:bodyPr rtlCol="0" anchor="ctr"/>
+            <a:lstStyle>
+              <a:defPPr>
+                <a:defRPr lang="de-DE"/>
+              </a:defPPr>
+              <a:lvl1pPr marL="0" algn="l" defTabSz="914400" rtl="0" eaLnBrk="1" latinLnBrk="0" hangingPunct="1">
+                <a:defRPr sz="1800" kern="1200">
+                  <a:solidFill>
+                    <a:schemeClr val="lt1"/>
+                  </a:solidFill>
+                  <a:latin typeface="+mn-lt"/>
+                  <a:ea typeface="+mn-ea"/>
+                  <a:cs typeface="+mn-cs"/>
+                </a:defRPr>
+              </a:lvl1pPr>
+              <a:lvl2pPr marL="457200" algn="l" defTabSz="914400" rtl="0" eaLnBrk="1" latinLnBrk="0" hangingPunct="1">
+                <a:defRPr sz="1800" kern="1200">
+                  <a:solidFill>
+                    <a:schemeClr val="lt1"/>
+                  </a:solidFill>
+                  <a:latin typeface="+mn-lt"/>
+                  <a:ea typeface="+mn-ea"/>
+                  <a:cs typeface="+mn-cs"/>
+                </a:defRPr>
+              </a:lvl2pPr>
+              <a:lvl3pPr marL="914400" algn="l" defTabSz="914400" rtl="0" eaLnBrk="1" latinLnBrk="0" hangingPunct="1">
+                <a:defRPr sz="1800" kern="1200">
+                  <a:solidFill>
+                    <a:schemeClr val="lt1"/>
+                  </a:solidFill>
+                  <a:latin typeface="+mn-lt"/>
+                  <a:ea typeface="+mn-ea"/>
+                  <a:cs typeface="+mn-cs"/>
+                </a:defRPr>
+              </a:lvl3pPr>
+              <a:lvl4pPr marL="1371600" algn="l" defTabSz="914400" rtl="0" eaLnBrk="1" latinLnBrk="0" hangingPunct="1">
+                <a:defRPr sz="1800" kern="1200">
+                  <a:solidFill>
+                    <a:schemeClr val="lt1"/>
+                  </a:solidFill>
+                  <a:latin typeface="+mn-lt"/>
+                  <a:ea typeface="+mn-ea"/>
+                  <a:cs typeface="+mn-cs"/>
+                </a:defRPr>
+              </a:lvl4pPr>
+              <a:lvl5pPr marL="1828800" algn="l" defTabSz="914400" rtl="0" eaLnBrk="1" latinLnBrk="0" hangingPunct="1">
+                <a:defRPr sz="1800" kern="1200">
+                  <a:solidFill>
+                    <a:schemeClr val="lt1"/>
+                  </a:solidFill>
+                  <a:latin typeface="+mn-lt"/>
+                  <a:ea typeface="+mn-ea"/>
+                  <a:cs typeface="+mn-cs"/>
+                </a:defRPr>
+              </a:lvl5pPr>
+              <a:lvl6pPr marL="2286000" algn="l" defTabSz="914400" rtl="0" eaLnBrk="1" latinLnBrk="0" hangingPunct="1">
+                <a:defRPr sz="1800" kern="1200">
+                  <a:solidFill>
+                    <a:schemeClr val="lt1"/>
+                  </a:solidFill>
+                  <a:latin typeface="+mn-lt"/>
+                  <a:ea typeface="+mn-ea"/>
+                  <a:cs typeface="+mn-cs"/>
+                </a:defRPr>
+              </a:lvl6pPr>
+              <a:lvl7pPr marL="2743200" algn="l" defTabSz="914400" rtl="0" eaLnBrk="1" latinLnBrk="0" hangingPunct="1">
+                <a:defRPr sz="1800" kern="1200">
+                  <a:solidFill>
+                    <a:schemeClr val="lt1"/>
+                  </a:solidFill>
+                  <a:latin typeface="+mn-lt"/>
+                  <a:ea typeface="+mn-ea"/>
+                  <a:cs typeface="+mn-cs"/>
+                </a:defRPr>
+              </a:lvl7pPr>
+              <a:lvl8pPr marL="3200400" algn="l" defTabSz="914400" rtl="0" eaLnBrk="1" latinLnBrk="0" hangingPunct="1">
+                <a:defRPr sz="1800" kern="1200">
+                  <a:solidFill>
+                    <a:schemeClr val="lt1"/>
+                  </a:solidFill>
+                  <a:latin typeface="+mn-lt"/>
+                  <a:ea typeface="+mn-ea"/>
+                  <a:cs typeface="+mn-cs"/>
+                </a:defRPr>
+              </a:lvl8pPr>
+              <a:lvl9pPr marL="3657600" algn="l" defTabSz="914400" rtl="0" eaLnBrk="1" latinLnBrk="0" hangingPunct="1">
+                <a:defRPr sz="1800" kern="1200">
+                  <a:solidFill>
+                    <a:schemeClr val="lt1"/>
+                  </a:solidFill>
+                  <a:latin typeface="+mn-lt"/>
+                  <a:ea typeface="+mn-ea"/>
+                  <a:cs typeface="+mn-cs"/>
+                </a:defRPr>
+              </a:lvl9pPr>
+            </a:lstStyle>
+            <a:p>
+              <a:pPr algn="ctr"/>
+              <a:endParaRPr lang="de-DE"/>
+            </a:p>
+          </p:txBody>
+        </p:sp>
+        <p:sp>
+          <p:nvSpPr>
+            <p:cNvPr id="19" name="Rounded Rectangle 18"/>
+            <p:cNvSpPr/>
+            <p:nvPr/>
+          </p:nvSpPr>
+          <p:spPr>
+            <a:xfrm>
+              <a:off x="3825044" y="611560"/>
+              <a:ext cx="2304256" cy="2293223"/>
+            </a:xfrm>
+            <a:prstGeom prst="roundRect">
+              <a:avLst/>
+            </a:prstGeom>
+            <a:noFill/>
+            <a:ln w="31750"/>
+          </p:spPr>
+          <p:style>
+            <a:lnRef idx="2">
+              <a:schemeClr val="accent1">
+                <a:shade val="50000"/>
+              </a:schemeClr>
+            </a:lnRef>
+            <a:fillRef idx="1">
+              <a:schemeClr val="accent1"/>
+            </a:fillRef>
+            <a:effectRef idx="0">
+              <a:schemeClr val="accent1"/>
+            </a:effectRef>
+            <a:fontRef idx="minor">
+              <a:schemeClr val="lt1"/>
+            </a:fontRef>
+          </p:style>
+          <p:txBody>
+            <a:bodyPr rtlCol="0" anchor="ctr"/>
+            <a:lstStyle>
+              <a:defPPr>
+                <a:defRPr lang="de-DE"/>
+              </a:defPPr>
+              <a:lvl1pPr marL="0" algn="l" defTabSz="914400" rtl="0" eaLnBrk="1" latinLnBrk="0" hangingPunct="1">
+                <a:defRPr sz="1800" kern="1200">
+                  <a:solidFill>
+                    <a:schemeClr val="lt1"/>
+                  </a:solidFill>
+                  <a:latin typeface="+mn-lt"/>
+                  <a:ea typeface="+mn-ea"/>
+                  <a:cs typeface="+mn-cs"/>
+                </a:defRPr>
+              </a:lvl1pPr>
+              <a:lvl2pPr marL="457200" algn="l" defTabSz="914400" rtl="0" eaLnBrk="1" latinLnBrk="0" hangingPunct="1">
+                <a:defRPr sz="1800" kern="1200">
+                  <a:solidFill>
+                    <a:schemeClr val="lt1"/>
+                  </a:solidFill>
+                  <a:latin typeface="+mn-lt"/>
+                  <a:ea typeface="+mn-ea"/>
+                  <a:cs typeface="+mn-cs"/>
+                </a:defRPr>
+              </a:lvl2pPr>
+              <a:lvl3pPr marL="914400" algn="l" defTabSz="914400" rtl="0" eaLnBrk="1" latinLnBrk="0" hangingPunct="1">
+                <a:defRPr sz="1800" kern="1200">
+                  <a:solidFill>
+                    <a:schemeClr val="lt1"/>
+                  </a:solidFill>
+                  <a:latin typeface="+mn-lt"/>
+                  <a:ea typeface="+mn-ea"/>
+                  <a:cs typeface="+mn-cs"/>
+                </a:defRPr>
+              </a:lvl3pPr>
+              <a:lvl4pPr marL="1371600" algn="l" defTabSz="914400" rtl="0" eaLnBrk="1" latinLnBrk="0" hangingPunct="1">
+                <a:defRPr sz="1800" kern="1200">
+                  <a:solidFill>
+                    <a:schemeClr val="lt1"/>
+                  </a:solidFill>
+                  <a:latin typeface="+mn-lt"/>
+                  <a:ea typeface="+mn-ea"/>
+                  <a:cs typeface="+mn-cs"/>
+                </a:defRPr>
+              </a:lvl4pPr>
+              <a:lvl5pPr marL="1828800" algn="l" defTabSz="914400" rtl="0" eaLnBrk="1" latinLnBrk="0" hangingPunct="1">
+                <a:defRPr sz="1800" kern="1200">
+                  <a:solidFill>
+                    <a:schemeClr val="lt1"/>
+                  </a:solidFill>
+                  <a:latin typeface="+mn-lt"/>
+                  <a:ea typeface="+mn-ea"/>
+                  <a:cs typeface="+mn-cs"/>
+                </a:defRPr>
+              </a:lvl5pPr>
+              <a:lvl6pPr marL="2286000" algn="l" defTabSz="914400" rtl="0" eaLnBrk="1" latinLnBrk="0" hangingPunct="1">
+                <a:defRPr sz="1800" kern="1200">
+                  <a:solidFill>
+                    <a:schemeClr val="lt1"/>
+                  </a:solidFill>
+                  <a:latin typeface="+mn-lt"/>
+                  <a:ea typeface="+mn-ea"/>
+                  <a:cs typeface="+mn-cs"/>
+                </a:defRPr>
+              </a:lvl6pPr>
+              <a:lvl7pPr marL="2743200" algn="l" defTabSz="914400" rtl="0" eaLnBrk="1" latinLnBrk="0" hangingPunct="1">
+                <a:defRPr sz="1800" kern="1200">
+                  <a:solidFill>
+                    <a:schemeClr val="lt1"/>
+                  </a:solidFill>
+                  <a:latin typeface="+mn-lt"/>
+                  <a:ea typeface="+mn-ea"/>
+                  <a:cs typeface="+mn-cs"/>
+                </a:defRPr>
+              </a:lvl7pPr>
+              <a:lvl8pPr marL="3200400" algn="l" defTabSz="914400" rtl="0" eaLnBrk="1" latinLnBrk="0" hangingPunct="1">
+                <a:defRPr sz="1800" kern="1200">
+                  <a:solidFill>
+                    <a:schemeClr val="lt1"/>
+                  </a:solidFill>
+                  <a:latin typeface="+mn-lt"/>
+                  <a:ea typeface="+mn-ea"/>
+                  <a:cs typeface="+mn-cs"/>
+                </a:defRPr>
+              </a:lvl8pPr>
+              <a:lvl9pPr marL="3657600" algn="l" defTabSz="914400" rtl="0" eaLnBrk="1" latinLnBrk="0" hangingPunct="1">
+                <a:defRPr sz="1800" kern="1200">
+                  <a:solidFill>
+                    <a:schemeClr val="lt1"/>
+                  </a:solidFill>
+                  <a:latin typeface="+mn-lt"/>
+                  <a:ea typeface="+mn-ea"/>
+                  <a:cs typeface="+mn-cs"/>
+                </a:defRPr>
+              </a:lvl9pPr>
+            </a:lstStyle>
+            <a:p>
+              <a:pPr algn="ctr"/>
+              <a:endParaRPr lang="de-DE"/>
+            </a:p>
+          </p:txBody>
+        </p:sp>
+        <p:sp>
+          <p:nvSpPr>
+            <p:cNvPr id="22" name="Rounded Rectangle 21"/>
+            <p:cNvSpPr/>
+            <p:nvPr/>
+          </p:nvSpPr>
+          <p:spPr>
+            <a:xfrm>
+              <a:off x="868524" y="971600"/>
+              <a:ext cx="1224136" cy="1800200"/>
+            </a:xfrm>
+            <a:prstGeom prst="roundRect">
+              <a:avLst/>
+            </a:prstGeom>
+            <a:solidFill>
+              <a:schemeClr val="accent2">
+                <a:lumMod val="20000"/>
+                <a:lumOff val="80000"/>
+              </a:schemeClr>
+            </a:solidFill>
+            <a:ln w="31750">
+              <a:solidFill>
+                <a:srgbClr val="C00000"/>
+              </a:solidFill>
+            </a:ln>
+          </p:spPr>
+          <p:style>
+            <a:lnRef idx="2">
+              <a:schemeClr val="accent1">
+                <a:shade val="50000"/>
+              </a:schemeClr>
+            </a:lnRef>
+            <a:fillRef idx="1">
+              <a:schemeClr val="accent1"/>
+            </a:fillRef>
+            <a:effectRef idx="0">
+              <a:schemeClr val="accent1"/>
+            </a:effectRef>
+            <a:fontRef idx="minor">
+              <a:schemeClr val="lt1"/>
+            </a:fontRef>
+          </p:style>
+          <p:txBody>
+            <a:bodyPr rtlCol="0" anchor="ctr"/>
+            <a:lstStyle>
+              <a:defPPr>
+                <a:defRPr lang="de-DE"/>
+              </a:defPPr>
+              <a:lvl1pPr marL="0" algn="l" defTabSz="914400" rtl="0" eaLnBrk="1" latinLnBrk="0" hangingPunct="1">
+                <a:defRPr sz="1800" kern="1200">
+                  <a:solidFill>
+                    <a:schemeClr val="lt1"/>
+                  </a:solidFill>
+                  <a:latin typeface="+mn-lt"/>
+                  <a:ea typeface="+mn-ea"/>
+                  <a:cs typeface="+mn-cs"/>
+                </a:defRPr>
+              </a:lvl1pPr>
+              <a:lvl2pPr marL="457200" algn="l" defTabSz="914400" rtl="0" eaLnBrk="1" latinLnBrk="0" hangingPunct="1">
+                <a:defRPr sz="1800" kern="1200">
+                  <a:solidFill>
+                    <a:schemeClr val="lt1"/>
+                  </a:solidFill>
+                  <a:latin typeface="+mn-lt"/>
+                  <a:ea typeface="+mn-ea"/>
+                  <a:cs typeface="+mn-cs"/>
+                </a:defRPr>
+              </a:lvl2pPr>
+              <a:lvl3pPr marL="914400" algn="l" defTabSz="914400" rtl="0" eaLnBrk="1" latinLnBrk="0" hangingPunct="1">
+                <a:defRPr sz="1800" kern="1200">
+                  <a:solidFill>
+                    <a:schemeClr val="lt1"/>
+                  </a:solidFill>
+                  <a:latin typeface="+mn-lt"/>
+                  <a:ea typeface="+mn-ea"/>
+                  <a:cs typeface="+mn-cs"/>
+                </a:defRPr>
+              </a:lvl3pPr>
+              <a:lvl4pPr marL="1371600" algn="l" defTabSz="914400" rtl="0" eaLnBrk="1" latinLnBrk="0" hangingPunct="1">
+                <a:defRPr sz="1800" kern="1200">
+                  <a:solidFill>
+                    <a:schemeClr val="lt1"/>
+                  </a:solidFill>
+                  <a:latin typeface="+mn-lt"/>
+                  <a:ea typeface="+mn-ea"/>
+                  <a:cs typeface="+mn-cs"/>
+                </a:defRPr>
+              </a:lvl4pPr>
+              <a:lvl5pPr marL="1828800" algn="l" defTabSz="914400" rtl="0" eaLnBrk="1" latinLnBrk="0" hangingPunct="1">
+                <a:defRPr sz="1800" kern="1200">
+                  <a:solidFill>
+                    <a:schemeClr val="lt1"/>
+                  </a:solidFill>
+                  <a:latin typeface="+mn-lt"/>
+                  <a:ea typeface="+mn-ea"/>
+                  <a:cs typeface="+mn-cs"/>
+                </a:defRPr>
+              </a:lvl5pPr>
+              <a:lvl6pPr marL="2286000" algn="l" defTabSz="914400" rtl="0" eaLnBrk="1" latinLnBrk="0" hangingPunct="1">
+                <a:defRPr sz="1800" kern="1200">
+                  <a:solidFill>
+                    <a:schemeClr val="lt1"/>
+                  </a:solidFill>
+                  <a:latin typeface="+mn-lt"/>
+                  <a:ea typeface="+mn-ea"/>
+                  <a:cs typeface="+mn-cs"/>
+                </a:defRPr>
+              </a:lvl6pPr>
+              <a:lvl7pPr marL="2743200" algn="l" defTabSz="914400" rtl="0" eaLnBrk="1" latinLnBrk="0" hangingPunct="1">
+                <a:defRPr sz="1800" kern="1200">
+                  <a:solidFill>
+                    <a:schemeClr val="lt1"/>
+                  </a:solidFill>
+                  <a:latin typeface="+mn-lt"/>
+                  <a:ea typeface="+mn-ea"/>
+                  <a:cs typeface="+mn-cs"/>
+                </a:defRPr>
+              </a:lvl7pPr>
+              <a:lvl8pPr marL="3200400" algn="l" defTabSz="914400" rtl="0" eaLnBrk="1" latinLnBrk="0" hangingPunct="1">
+                <a:defRPr sz="1800" kern="1200">
+                  <a:solidFill>
+                    <a:schemeClr val="lt1"/>
+                  </a:solidFill>
+                  <a:latin typeface="+mn-lt"/>
+                  <a:ea typeface="+mn-ea"/>
+                  <a:cs typeface="+mn-cs"/>
+                </a:defRPr>
+              </a:lvl8pPr>
+              <a:lvl9pPr marL="3657600" algn="l" defTabSz="914400" rtl="0" eaLnBrk="1" latinLnBrk="0" hangingPunct="1">
+                <a:defRPr sz="1800" kern="1200">
+                  <a:solidFill>
+                    <a:schemeClr val="lt1"/>
+                  </a:solidFill>
+                  <a:latin typeface="+mn-lt"/>
+                  <a:ea typeface="+mn-ea"/>
+                  <a:cs typeface="+mn-cs"/>
+                </a:defRPr>
+              </a:lvl9pPr>
+            </a:lstStyle>
+            <a:p>
+              <a:pPr algn="ctr"/>
+              <a:endParaRPr lang="de-DE" sz="1000" b="1" dirty="0"/>
+            </a:p>
+          </p:txBody>
+        </p:sp>
+        <p:sp>
+          <p:nvSpPr>
+            <p:cNvPr id="24" name="Rounded Rectangle 23"/>
+            <p:cNvSpPr/>
+            <p:nvPr/>
+          </p:nvSpPr>
+          <p:spPr>
+            <a:xfrm>
+              <a:off x="2254548" y="961604"/>
+              <a:ext cx="1224136" cy="1800200"/>
+            </a:xfrm>
+            <a:prstGeom prst="roundRect">
+              <a:avLst/>
+            </a:prstGeom>
+            <a:solidFill>
+              <a:schemeClr val="accent2">
+                <a:lumMod val="20000"/>
+                <a:lumOff val="80000"/>
+              </a:schemeClr>
+            </a:solidFill>
+            <a:ln w="31750">
+              <a:solidFill>
+                <a:srgbClr val="C00000"/>
+              </a:solidFill>
+            </a:ln>
+          </p:spPr>
+          <p:style>
+            <a:lnRef idx="2">
+              <a:schemeClr val="accent1">
+                <a:shade val="50000"/>
+              </a:schemeClr>
+            </a:lnRef>
+            <a:fillRef idx="1">
+              <a:schemeClr val="accent1"/>
+            </a:fillRef>
+            <a:effectRef idx="0">
+              <a:schemeClr val="accent1"/>
+            </a:effectRef>
+            <a:fontRef idx="minor">
+              <a:schemeClr val="lt1"/>
+            </a:fontRef>
+          </p:style>
+          <p:txBody>
+            <a:bodyPr rtlCol="0" anchor="ctr"/>
+            <a:lstStyle>
+              <a:defPPr>
+                <a:defRPr lang="de-DE"/>
+              </a:defPPr>
+              <a:lvl1pPr marL="0" algn="l" defTabSz="914400" rtl="0" eaLnBrk="1" latinLnBrk="0" hangingPunct="1">
+                <a:defRPr sz="1800" kern="1200">
+                  <a:solidFill>
+                    <a:schemeClr val="lt1"/>
+                  </a:solidFill>
+                  <a:latin typeface="+mn-lt"/>
+                  <a:ea typeface="+mn-ea"/>
+                  <a:cs typeface="+mn-cs"/>
+                </a:defRPr>
+              </a:lvl1pPr>
+              <a:lvl2pPr marL="457200" algn="l" defTabSz="914400" rtl="0" eaLnBrk="1" latinLnBrk="0" hangingPunct="1">
+                <a:defRPr sz="1800" kern="1200">
+                  <a:solidFill>
+                    <a:schemeClr val="lt1"/>
+                  </a:solidFill>
+                  <a:latin typeface="+mn-lt"/>
+                  <a:ea typeface="+mn-ea"/>
+                  <a:cs typeface="+mn-cs"/>
+                </a:defRPr>
+              </a:lvl2pPr>
+              <a:lvl3pPr marL="914400" algn="l" defTabSz="914400" rtl="0" eaLnBrk="1" latinLnBrk="0" hangingPunct="1">
+                <a:defRPr sz="1800" kern="1200">
+                  <a:solidFill>
+                    <a:schemeClr val="lt1"/>
+                  </a:solidFill>
+                  <a:latin typeface="+mn-lt"/>
+                  <a:ea typeface="+mn-ea"/>
+                  <a:cs typeface="+mn-cs"/>
+                </a:defRPr>
+              </a:lvl3pPr>
+              <a:lvl4pPr marL="1371600" algn="l" defTabSz="914400" rtl="0" eaLnBrk="1" latinLnBrk="0" hangingPunct="1">
+                <a:defRPr sz="1800" kern="1200">
+                  <a:solidFill>
+                    <a:schemeClr val="lt1"/>
+                  </a:solidFill>
+                  <a:latin typeface="+mn-lt"/>
+                  <a:ea typeface="+mn-ea"/>
+                  <a:cs typeface="+mn-cs"/>
+                </a:defRPr>
+              </a:lvl4pPr>
+              <a:lvl5pPr marL="1828800" algn="l" defTabSz="914400" rtl="0" eaLnBrk="1" latinLnBrk="0" hangingPunct="1">
+                <a:defRPr sz="1800" kern="1200">
+                  <a:solidFill>
+                    <a:schemeClr val="lt1"/>
+                  </a:solidFill>
+                  <a:latin typeface="+mn-lt"/>
+                  <a:ea typeface="+mn-ea"/>
+                  <a:cs typeface="+mn-cs"/>
+                </a:defRPr>
+              </a:lvl5pPr>
+              <a:lvl6pPr marL="2286000" algn="l" defTabSz="914400" rtl="0" eaLnBrk="1" latinLnBrk="0" hangingPunct="1">
+                <a:defRPr sz="1800" kern="1200">
+                  <a:solidFill>
+                    <a:schemeClr val="lt1"/>
+                  </a:solidFill>
+                  <a:latin typeface="+mn-lt"/>
+                  <a:ea typeface="+mn-ea"/>
+                  <a:cs typeface="+mn-cs"/>
+                </a:defRPr>
+              </a:lvl6pPr>
+              <a:lvl7pPr marL="2743200" algn="l" defTabSz="914400" rtl="0" eaLnBrk="1" latinLnBrk="0" hangingPunct="1">
+                <a:defRPr sz="1800" kern="1200">
+                  <a:solidFill>
+                    <a:schemeClr val="lt1"/>
+                  </a:solidFill>
+                  <a:latin typeface="+mn-lt"/>
+                  <a:ea typeface="+mn-ea"/>
+                  <a:cs typeface="+mn-cs"/>
+                </a:defRPr>
+              </a:lvl7pPr>
+              <a:lvl8pPr marL="3200400" algn="l" defTabSz="914400" rtl="0" eaLnBrk="1" latinLnBrk="0" hangingPunct="1">
+                <a:defRPr sz="1800" kern="1200">
+                  <a:solidFill>
+                    <a:schemeClr val="lt1"/>
+                  </a:solidFill>
+                  <a:latin typeface="+mn-lt"/>
+                  <a:ea typeface="+mn-ea"/>
+                  <a:cs typeface="+mn-cs"/>
+                </a:defRPr>
+              </a:lvl8pPr>
+              <a:lvl9pPr marL="3657600" algn="l" defTabSz="914400" rtl="0" eaLnBrk="1" latinLnBrk="0" hangingPunct="1">
+                <a:defRPr sz="1800" kern="1200">
+                  <a:solidFill>
+                    <a:schemeClr val="lt1"/>
+                  </a:solidFill>
+                  <a:latin typeface="+mn-lt"/>
+                  <a:ea typeface="+mn-ea"/>
+                  <a:cs typeface="+mn-cs"/>
+                </a:defRPr>
+              </a:lvl9pPr>
+            </a:lstStyle>
+            <a:p>
+              <a:pPr algn="ctr"/>
+              <a:endParaRPr lang="de-DE" sz="1000" b="1"/>
+            </a:p>
+          </p:txBody>
+        </p:sp>
+        <p:sp>
+          <p:nvSpPr>
+            <p:cNvPr id="25" name="Rounded Rectangle 24"/>
+            <p:cNvSpPr/>
+            <p:nvPr/>
+          </p:nvSpPr>
+          <p:spPr>
+            <a:xfrm>
+              <a:off x="1012540" y="1141016"/>
+              <a:ext cx="936104" cy="936104"/>
+            </a:xfrm>
+            <a:prstGeom prst="roundRect">
+              <a:avLst/>
+            </a:prstGeom>
+            <a:solidFill>
+              <a:schemeClr val="accent2"/>
+            </a:solidFill>
+            <a:ln w="31750">
+              <a:solidFill>
+                <a:srgbClr val="C00000"/>
+              </a:solidFill>
+            </a:ln>
+          </p:spPr>
+          <p:style>
+            <a:lnRef idx="2">
+              <a:schemeClr val="accent1">
+                <a:shade val="50000"/>
+              </a:schemeClr>
+            </a:lnRef>
+            <a:fillRef idx="1">
+              <a:schemeClr val="accent1"/>
+            </a:fillRef>
+            <a:effectRef idx="0">
+              <a:schemeClr val="accent1"/>
+            </a:effectRef>
+            <a:fontRef idx="minor">
+              <a:schemeClr val="lt1"/>
+            </a:fontRef>
+          </p:style>
+          <p:txBody>
+            <a:bodyPr lIns="0" tIns="0" rIns="36000" bIns="36000" rtlCol="0" anchor="ctr"/>
+            <a:lstStyle>
+              <a:defPPr>
+                <a:defRPr lang="de-DE"/>
+              </a:defPPr>
+              <a:lvl1pPr marL="0" algn="l" defTabSz="914400" rtl="0" eaLnBrk="1" latinLnBrk="0" hangingPunct="1">
+                <a:defRPr sz="1800" kern="1200">
+                  <a:solidFill>
+                    <a:schemeClr val="lt1"/>
+                  </a:solidFill>
+                  <a:latin typeface="+mn-lt"/>
+                  <a:ea typeface="+mn-ea"/>
+                  <a:cs typeface="+mn-cs"/>
+                </a:defRPr>
+              </a:lvl1pPr>
+              <a:lvl2pPr marL="457200" algn="l" defTabSz="914400" rtl="0" eaLnBrk="1" latinLnBrk="0" hangingPunct="1">
+                <a:defRPr sz="1800" kern="1200">
+                  <a:solidFill>
+                    <a:schemeClr val="lt1"/>
+                  </a:solidFill>
+                  <a:latin typeface="+mn-lt"/>
+                  <a:ea typeface="+mn-ea"/>
+                  <a:cs typeface="+mn-cs"/>
+                </a:defRPr>
+              </a:lvl2pPr>
+              <a:lvl3pPr marL="914400" algn="l" defTabSz="914400" rtl="0" eaLnBrk="1" latinLnBrk="0" hangingPunct="1">
+                <a:defRPr sz="1800" kern="1200">
+                  <a:solidFill>
+                    <a:schemeClr val="lt1"/>
+                  </a:solidFill>
+                  <a:latin typeface="+mn-lt"/>
+                  <a:ea typeface="+mn-ea"/>
+                  <a:cs typeface="+mn-cs"/>
+                </a:defRPr>
+              </a:lvl3pPr>
+              <a:lvl4pPr marL="1371600" algn="l" defTabSz="914400" rtl="0" eaLnBrk="1" latinLnBrk="0" hangingPunct="1">
+                <a:defRPr sz="1800" kern="1200">
+                  <a:solidFill>
+                    <a:schemeClr val="lt1"/>
+                  </a:solidFill>
+                  <a:latin typeface="+mn-lt"/>
+                  <a:ea typeface="+mn-ea"/>
+                  <a:cs typeface="+mn-cs"/>
+                </a:defRPr>
+              </a:lvl4pPr>
+              <a:lvl5pPr marL="1828800" algn="l" defTabSz="914400" rtl="0" eaLnBrk="1" latinLnBrk="0" hangingPunct="1">
+                <a:defRPr sz="1800" kern="1200">
+                  <a:solidFill>
+                    <a:schemeClr val="lt1"/>
+                  </a:solidFill>
+                  <a:latin typeface="+mn-lt"/>
+                  <a:ea typeface="+mn-ea"/>
+                  <a:cs typeface="+mn-cs"/>
+                </a:defRPr>
+              </a:lvl5pPr>
+              <a:lvl6pPr marL="2286000" algn="l" defTabSz="914400" rtl="0" eaLnBrk="1" latinLnBrk="0" hangingPunct="1">
+                <a:defRPr sz="1800" kern="1200">
+                  <a:solidFill>
+                    <a:schemeClr val="lt1"/>
+                  </a:solidFill>
+                  <a:latin typeface="+mn-lt"/>
+                  <a:ea typeface="+mn-ea"/>
+                  <a:cs typeface="+mn-cs"/>
+                </a:defRPr>
+              </a:lvl6pPr>
+              <a:lvl7pPr marL="2743200" algn="l" defTabSz="914400" rtl="0" eaLnBrk="1" latinLnBrk="0" hangingPunct="1">
+                <a:defRPr sz="1800" kern="1200">
+                  <a:solidFill>
+                    <a:schemeClr val="lt1"/>
+                  </a:solidFill>
+                  <a:latin typeface="+mn-lt"/>
+                  <a:ea typeface="+mn-ea"/>
+                  <a:cs typeface="+mn-cs"/>
+                </a:defRPr>
+              </a:lvl7pPr>
+              <a:lvl8pPr marL="3200400" algn="l" defTabSz="914400" rtl="0" eaLnBrk="1" latinLnBrk="0" hangingPunct="1">
+                <a:defRPr sz="1800" kern="1200">
+                  <a:solidFill>
+                    <a:schemeClr val="lt1"/>
+                  </a:solidFill>
+                  <a:latin typeface="+mn-lt"/>
+                  <a:ea typeface="+mn-ea"/>
+                  <a:cs typeface="+mn-cs"/>
+                </a:defRPr>
+              </a:lvl8pPr>
+              <a:lvl9pPr marL="3657600" algn="l" defTabSz="914400" rtl="0" eaLnBrk="1" latinLnBrk="0" hangingPunct="1">
+                <a:defRPr sz="1800" kern="1200">
+                  <a:solidFill>
+                    <a:schemeClr val="lt1"/>
+                  </a:solidFill>
+                  <a:latin typeface="+mn-lt"/>
+                  <a:ea typeface="+mn-ea"/>
+                  <a:cs typeface="+mn-cs"/>
+                </a:defRPr>
+              </a:lvl9pPr>
+            </a:lstStyle>
+            <a:p>
+              <a:pPr algn="ctr"/>
+              <a:r>
+                <a:rPr lang="de-DE" sz="1000" b="1" dirty="0" smtClean="0">
+                  <a:solidFill>
+                    <a:schemeClr val="tx1"/>
+                  </a:solidFill>
+                  <a:latin typeface="Arial" panose="020B0604020202020204" pitchFamily="34" charset="0"/>
+                  <a:cs typeface="Arial" panose="020B0604020202020204" pitchFamily="34" charset="0"/>
+                </a:rPr>
+                <a:t>Subscription Service</a:t>
+              </a:r>
+              <a:endParaRPr lang="de-DE" sz="1000" b="1" dirty="0">
+                <a:solidFill>
+                  <a:schemeClr val="tx1"/>
+                </a:solidFill>
+                <a:latin typeface="Arial" panose="020B0604020202020204" pitchFamily="34" charset="0"/>
+                <a:cs typeface="Arial" panose="020B0604020202020204" pitchFamily="34" charset="0"/>
+              </a:endParaRPr>
+            </a:p>
+          </p:txBody>
+        </p:sp>
+        <p:sp>
+          <p:nvSpPr>
+            <p:cNvPr id="27" name="TextBox 11"/>
+            <p:cNvSpPr txBox="1"/>
+            <p:nvPr/>
+          </p:nvSpPr>
+          <p:spPr>
+            <a:xfrm>
+              <a:off x="872716" y="694601"/>
+              <a:ext cx="2124236" cy="276999"/>
+            </a:xfrm>
+            <a:prstGeom prst="rect">
+              <a:avLst/>
+            </a:prstGeom>
+            <a:noFill/>
+          </p:spPr>
+          <p:txBody>
+            <a:bodyPr wrap="square" rtlCol="0">
+              <a:spAutoFit/>
+            </a:bodyPr>
+            <a:lstStyle>
+              <a:defPPr>
+                <a:defRPr lang="de-DE"/>
+              </a:defPPr>
+              <a:lvl1pPr marL="0" algn="l" defTabSz="914400" rtl="0" eaLnBrk="1" latinLnBrk="0" hangingPunct="1">
+                <a:defRPr sz="1800" kern="1200">
+                  <a:solidFill>
+                    <a:schemeClr val="tx1"/>
+                  </a:solidFill>
+                  <a:latin typeface="+mn-lt"/>
+                  <a:ea typeface="+mn-ea"/>
+                  <a:cs typeface="+mn-cs"/>
+                </a:defRPr>
+              </a:lvl1pPr>
+              <a:lvl2pPr marL="457200" algn="l" defTabSz="914400" rtl="0" eaLnBrk="1" latinLnBrk="0" hangingPunct="1">
+                <a:defRPr sz="1800" kern="1200">
+                  <a:solidFill>
+                    <a:schemeClr val="tx1"/>
+                  </a:solidFill>
+                  <a:latin typeface="+mn-lt"/>
+                  <a:ea typeface="+mn-ea"/>
+                  <a:cs typeface="+mn-cs"/>
+                </a:defRPr>
+              </a:lvl2pPr>
+              <a:lvl3pPr marL="914400" algn="l" defTabSz="914400" rtl="0" eaLnBrk="1" latinLnBrk="0" hangingPunct="1">
+                <a:defRPr sz="1800" kern="1200">
+                  <a:solidFill>
+                    <a:schemeClr val="tx1"/>
+                  </a:solidFill>
+                  <a:latin typeface="+mn-lt"/>
+                  <a:ea typeface="+mn-ea"/>
+                  <a:cs typeface="+mn-cs"/>
+                </a:defRPr>
+              </a:lvl3pPr>
+              <a:lvl4pPr marL="1371600" algn="l" defTabSz="914400" rtl="0" eaLnBrk="1" latinLnBrk="0" hangingPunct="1">
+                <a:defRPr sz="1800" kern="1200">
+                  <a:solidFill>
+                    <a:schemeClr val="tx1"/>
+                  </a:solidFill>
+                  <a:latin typeface="+mn-lt"/>
+                  <a:ea typeface="+mn-ea"/>
+                  <a:cs typeface="+mn-cs"/>
+                </a:defRPr>
+              </a:lvl4pPr>
+              <a:lvl5pPr marL="1828800" algn="l" defTabSz="914400" rtl="0" eaLnBrk="1" latinLnBrk="0" hangingPunct="1">
+                <a:defRPr sz="1800" kern="1200">
+                  <a:solidFill>
+                    <a:schemeClr val="tx1"/>
+                  </a:solidFill>
+                  <a:latin typeface="+mn-lt"/>
+                  <a:ea typeface="+mn-ea"/>
+                  <a:cs typeface="+mn-cs"/>
+                </a:defRPr>
+              </a:lvl5pPr>
+              <a:lvl6pPr marL="2286000" algn="l" defTabSz="914400" rtl="0" eaLnBrk="1" latinLnBrk="0" hangingPunct="1">
+                <a:defRPr sz="1800" kern="1200">
+                  <a:solidFill>
+                    <a:schemeClr val="tx1"/>
+                  </a:solidFill>
+                  <a:latin typeface="+mn-lt"/>
+                  <a:ea typeface="+mn-ea"/>
+                  <a:cs typeface="+mn-cs"/>
+                </a:defRPr>
+              </a:lvl6pPr>
+              <a:lvl7pPr marL="2743200" algn="l" defTabSz="914400" rtl="0" eaLnBrk="1" latinLnBrk="0" hangingPunct="1">
+                <a:defRPr sz="1800" kern="1200">
+                  <a:solidFill>
+                    <a:schemeClr val="tx1"/>
+                  </a:solidFill>
+                  <a:latin typeface="+mn-lt"/>
+                  <a:ea typeface="+mn-ea"/>
+                  <a:cs typeface="+mn-cs"/>
+                </a:defRPr>
+              </a:lvl7pPr>
+              <a:lvl8pPr marL="3200400" algn="l" defTabSz="914400" rtl="0" eaLnBrk="1" latinLnBrk="0" hangingPunct="1">
+                <a:defRPr sz="1800" kern="1200">
+                  <a:solidFill>
+                    <a:schemeClr val="tx1"/>
+                  </a:solidFill>
+                  <a:latin typeface="+mn-lt"/>
+                  <a:ea typeface="+mn-ea"/>
+                  <a:cs typeface="+mn-cs"/>
+                </a:defRPr>
+              </a:lvl8pPr>
+              <a:lvl9pPr marL="3657600" algn="l" defTabSz="914400" rtl="0" eaLnBrk="1" latinLnBrk="0" hangingPunct="1">
+                <a:defRPr sz="1800" kern="1200">
+                  <a:solidFill>
+                    <a:schemeClr val="tx1"/>
+                  </a:solidFill>
+                  <a:latin typeface="+mn-lt"/>
+                  <a:ea typeface="+mn-ea"/>
+                  <a:cs typeface="+mn-cs"/>
+                </a:defRPr>
+              </a:lvl9pPr>
+            </a:lstStyle>
+            <a:p>
+              <a:r>
+                <a:rPr lang="de-DE" sz="1200" b="1" dirty="0" smtClean="0">
+                  <a:latin typeface="Arial" panose="020B0604020202020204" pitchFamily="34" charset="0"/>
+                  <a:cs typeface="Arial" panose="020B0604020202020204" pitchFamily="34" charset="0"/>
+                </a:rPr>
+                <a:t>OSCM</a:t>
+              </a:r>
+              <a:endParaRPr lang="de-DE" sz="1200" b="1" dirty="0">
+                <a:latin typeface="Arial" panose="020B0604020202020204" pitchFamily="34" charset="0"/>
+                <a:cs typeface="Arial" panose="020B0604020202020204" pitchFamily="34" charset="0"/>
+              </a:endParaRPr>
+            </a:p>
+          </p:txBody>
+        </p:sp>
+        <p:sp>
+          <p:nvSpPr>
+            <p:cNvPr id="28" name="TextBox 12"/>
+            <p:cNvSpPr txBox="1"/>
+            <p:nvPr/>
+          </p:nvSpPr>
+          <p:spPr>
+            <a:xfrm>
+              <a:off x="3926111" y="694601"/>
+              <a:ext cx="535275" cy="276999"/>
+            </a:xfrm>
+            <a:prstGeom prst="rect">
+              <a:avLst/>
+            </a:prstGeom>
+            <a:noFill/>
+          </p:spPr>
+          <p:txBody>
+            <a:bodyPr wrap="none" rtlCol="0">
+              <a:spAutoFit/>
+            </a:bodyPr>
+            <a:lstStyle>
+              <a:defPPr>
+                <a:defRPr lang="de-DE"/>
+              </a:defPPr>
+              <a:lvl1pPr marL="0" algn="l" defTabSz="914400" rtl="0" eaLnBrk="1" latinLnBrk="0" hangingPunct="1">
+                <a:defRPr sz="1800" kern="1200">
+                  <a:solidFill>
+                    <a:schemeClr val="tx1"/>
+                  </a:solidFill>
+                  <a:latin typeface="+mn-lt"/>
+                  <a:ea typeface="+mn-ea"/>
+                  <a:cs typeface="+mn-cs"/>
+                </a:defRPr>
+              </a:lvl1pPr>
+              <a:lvl2pPr marL="457200" algn="l" defTabSz="914400" rtl="0" eaLnBrk="1" latinLnBrk="0" hangingPunct="1">
+                <a:defRPr sz="1800" kern="1200">
+                  <a:solidFill>
+                    <a:schemeClr val="tx1"/>
+                  </a:solidFill>
+                  <a:latin typeface="+mn-lt"/>
+                  <a:ea typeface="+mn-ea"/>
+                  <a:cs typeface="+mn-cs"/>
+                </a:defRPr>
+              </a:lvl2pPr>
+              <a:lvl3pPr marL="914400" algn="l" defTabSz="914400" rtl="0" eaLnBrk="1" latinLnBrk="0" hangingPunct="1">
+                <a:defRPr sz="1800" kern="1200">
+                  <a:solidFill>
+                    <a:schemeClr val="tx1"/>
+                  </a:solidFill>
+                  <a:latin typeface="+mn-lt"/>
+                  <a:ea typeface="+mn-ea"/>
+                  <a:cs typeface="+mn-cs"/>
+                </a:defRPr>
+              </a:lvl3pPr>
+              <a:lvl4pPr marL="1371600" algn="l" defTabSz="914400" rtl="0" eaLnBrk="1" latinLnBrk="0" hangingPunct="1">
+                <a:defRPr sz="1800" kern="1200">
+                  <a:solidFill>
+                    <a:schemeClr val="tx1"/>
+                  </a:solidFill>
+                  <a:latin typeface="+mn-lt"/>
+                  <a:ea typeface="+mn-ea"/>
+                  <a:cs typeface="+mn-cs"/>
+                </a:defRPr>
+              </a:lvl4pPr>
+              <a:lvl5pPr marL="1828800" algn="l" defTabSz="914400" rtl="0" eaLnBrk="1" latinLnBrk="0" hangingPunct="1">
+                <a:defRPr sz="1800" kern="1200">
+                  <a:solidFill>
+                    <a:schemeClr val="tx1"/>
+                  </a:solidFill>
+                  <a:latin typeface="+mn-lt"/>
+                  <a:ea typeface="+mn-ea"/>
+                  <a:cs typeface="+mn-cs"/>
+                </a:defRPr>
+              </a:lvl5pPr>
+              <a:lvl6pPr marL="2286000" algn="l" defTabSz="914400" rtl="0" eaLnBrk="1" latinLnBrk="0" hangingPunct="1">
+                <a:defRPr sz="1800" kern="1200">
+                  <a:solidFill>
+                    <a:schemeClr val="tx1"/>
+                  </a:solidFill>
+                  <a:latin typeface="+mn-lt"/>
+                  <a:ea typeface="+mn-ea"/>
+                  <a:cs typeface="+mn-cs"/>
+                </a:defRPr>
+              </a:lvl6pPr>
+              <a:lvl7pPr marL="2743200" algn="l" defTabSz="914400" rtl="0" eaLnBrk="1" latinLnBrk="0" hangingPunct="1">
+                <a:defRPr sz="1800" kern="1200">
+                  <a:solidFill>
+                    <a:schemeClr val="tx1"/>
+                  </a:solidFill>
+                  <a:latin typeface="+mn-lt"/>
+                  <a:ea typeface="+mn-ea"/>
+                  <a:cs typeface="+mn-cs"/>
+                </a:defRPr>
+              </a:lvl7pPr>
+              <a:lvl8pPr marL="3200400" algn="l" defTabSz="914400" rtl="0" eaLnBrk="1" latinLnBrk="0" hangingPunct="1">
+                <a:defRPr sz="1800" kern="1200">
+                  <a:solidFill>
+                    <a:schemeClr val="tx1"/>
+                  </a:solidFill>
+                  <a:latin typeface="+mn-lt"/>
+                  <a:ea typeface="+mn-ea"/>
+                  <a:cs typeface="+mn-cs"/>
+                </a:defRPr>
+              </a:lvl8pPr>
+              <a:lvl9pPr marL="3657600" algn="l" defTabSz="914400" rtl="0" eaLnBrk="1" latinLnBrk="0" hangingPunct="1">
+                <a:defRPr sz="1800" kern="1200">
+                  <a:solidFill>
+                    <a:schemeClr val="tx1"/>
+                  </a:solidFill>
+                  <a:latin typeface="+mn-lt"/>
+                  <a:ea typeface="+mn-ea"/>
+                  <a:cs typeface="+mn-cs"/>
+                </a:defRPr>
+              </a:lvl9pPr>
+            </a:lstStyle>
+            <a:p>
+              <a:r>
+                <a:rPr lang="de-DE" sz="1200" b="1" dirty="0" smtClean="0">
+                  <a:latin typeface="Arial" panose="020B0604020202020204" pitchFamily="34" charset="0"/>
+                  <a:cs typeface="Arial" panose="020B0604020202020204" pitchFamily="34" charset="0"/>
+                </a:rPr>
+                <a:t>AWS</a:t>
+              </a:r>
+              <a:endParaRPr lang="de-DE" sz="1200" b="1" dirty="0">
+                <a:latin typeface="Arial" panose="020B0604020202020204" pitchFamily="34" charset="0"/>
+                <a:cs typeface="Arial" panose="020B0604020202020204" pitchFamily="34" charset="0"/>
+              </a:endParaRPr>
+            </a:p>
+          </p:txBody>
+        </p:sp>
+        <p:sp>
+          <p:nvSpPr>
+            <p:cNvPr id="34" name="Rounded Rectangle 33"/>
+            <p:cNvSpPr/>
+            <p:nvPr/>
+          </p:nvSpPr>
+          <p:spPr>
+            <a:xfrm>
+              <a:off x="2397212" y="1148396"/>
+              <a:ext cx="936104" cy="936104"/>
+            </a:xfrm>
+            <a:prstGeom prst="roundRect">
+              <a:avLst/>
+            </a:prstGeom>
+            <a:solidFill>
+              <a:schemeClr val="accent2"/>
+            </a:solidFill>
+            <a:ln w="31750">
+              <a:solidFill>
+                <a:srgbClr val="C00000"/>
+              </a:solidFill>
+            </a:ln>
+          </p:spPr>
+          <p:style>
+            <a:lnRef idx="2">
+              <a:schemeClr val="accent1">
+                <a:shade val="50000"/>
+              </a:schemeClr>
+            </a:lnRef>
+            <a:fillRef idx="1">
+              <a:schemeClr val="accent1"/>
+            </a:fillRef>
+            <a:effectRef idx="0">
+              <a:schemeClr val="accent1"/>
+            </a:effectRef>
+            <a:fontRef idx="minor">
+              <a:schemeClr val="lt1"/>
+            </a:fontRef>
+          </p:style>
+          <p:txBody>
+            <a:bodyPr lIns="0" tIns="0" rIns="0" bIns="36000" rtlCol="0" anchor="ctr"/>
+            <a:lstStyle>
+              <a:defPPr>
+                <a:defRPr lang="de-DE"/>
+              </a:defPPr>
+              <a:lvl1pPr marL="0" algn="l" defTabSz="914400" rtl="0" eaLnBrk="1" latinLnBrk="0" hangingPunct="1">
+                <a:defRPr sz="1800" kern="1200">
+                  <a:solidFill>
+                    <a:schemeClr val="lt1"/>
+                  </a:solidFill>
+                  <a:latin typeface="+mn-lt"/>
+                  <a:ea typeface="+mn-ea"/>
+                  <a:cs typeface="+mn-cs"/>
+                </a:defRPr>
+              </a:lvl1pPr>
+              <a:lvl2pPr marL="457200" algn="l" defTabSz="914400" rtl="0" eaLnBrk="1" latinLnBrk="0" hangingPunct="1">
+                <a:defRPr sz="1800" kern="1200">
+                  <a:solidFill>
+                    <a:schemeClr val="lt1"/>
+                  </a:solidFill>
+                  <a:latin typeface="+mn-lt"/>
+                  <a:ea typeface="+mn-ea"/>
+                  <a:cs typeface="+mn-cs"/>
+                </a:defRPr>
+              </a:lvl2pPr>
+              <a:lvl3pPr marL="914400" algn="l" defTabSz="914400" rtl="0" eaLnBrk="1" latinLnBrk="0" hangingPunct="1">
+                <a:defRPr sz="1800" kern="1200">
+                  <a:solidFill>
+                    <a:schemeClr val="lt1"/>
+                  </a:solidFill>
+                  <a:latin typeface="+mn-lt"/>
+                  <a:ea typeface="+mn-ea"/>
+                  <a:cs typeface="+mn-cs"/>
+                </a:defRPr>
+              </a:lvl3pPr>
+              <a:lvl4pPr marL="1371600" algn="l" defTabSz="914400" rtl="0" eaLnBrk="1" latinLnBrk="0" hangingPunct="1">
+                <a:defRPr sz="1800" kern="1200">
+                  <a:solidFill>
+                    <a:schemeClr val="lt1"/>
+                  </a:solidFill>
+                  <a:latin typeface="+mn-lt"/>
+                  <a:ea typeface="+mn-ea"/>
+                  <a:cs typeface="+mn-cs"/>
+                </a:defRPr>
+              </a:lvl4pPr>
+              <a:lvl5pPr marL="1828800" algn="l" defTabSz="914400" rtl="0" eaLnBrk="1" latinLnBrk="0" hangingPunct="1">
+                <a:defRPr sz="1800" kern="1200">
+                  <a:solidFill>
+                    <a:schemeClr val="lt1"/>
+                  </a:solidFill>
+                  <a:latin typeface="+mn-lt"/>
+                  <a:ea typeface="+mn-ea"/>
+                  <a:cs typeface="+mn-cs"/>
+                </a:defRPr>
+              </a:lvl5pPr>
+              <a:lvl6pPr marL="2286000" algn="l" defTabSz="914400" rtl="0" eaLnBrk="1" latinLnBrk="0" hangingPunct="1">
+                <a:defRPr sz="1800" kern="1200">
+                  <a:solidFill>
+                    <a:schemeClr val="lt1"/>
+                  </a:solidFill>
+                  <a:latin typeface="+mn-lt"/>
+                  <a:ea typeface="+mn-ea"/>
+                  <a:cs typeface="+mn-cs"/>
+                </a:defRPr>
+              </a:lvl6pPr>
+              <a:lvl7pPr marL="2743200" algn="l" defTabSz="914400" rtl="0" eaLnBrk="1" latinLnBrk="0" hangingPunct="1">
+                <a:defRPr sz="1800" kern="1200">
+                  <a:solidFill>
+                    <a:schemeClr val="lt1"/>
+                  </a:solidFill>
+                  <a:latin typeface="+mn-lt"/>
+                  <a:ea typeface="+mn-ea"/>
+                  <a:cs typeface="+mn-cs"/>
+                </a:defRPr>
+              </a:lvl7pPr>
+              <a:lvl8pPr marL="3200400" algn="l" defTabSz="914400" rtl="0" eaLnBrk="1" latinLnBrk="0" hangingPunct="1">
+                <a:defRPr sz="1800" kern="1200">
+                  <a:solidFill>
+                    <a:schemeClr val="lt1"/>
+                  </a:solidFill>
+                  <a:latin typeface="+mn-lt"/>
+                  <a:ea typeface="+mn-ea"/>
+                  <a:cs typeface="+mn-cs"/>
+                </a:defRPr>
+              </a:lvl8pPr>
+              <a:lvl9pPr marL="3657600" algn="l" defTabSz="914400" rtl="0" eaLnBrk="1" latinLnBrk="0" hangingPunct="1">
+                <a:defRPr sz="1800" kern="1200">
+                  <a:solidFill>
+                    <a:schemeClr val="lt1"/>
+                  </a:solidFill>
+                  <a:latin typeface="+mn-lt"/>
+                  <a:ea typeface="+mn-ea"/>
+                  <a:cs typeface="+mn-cs"/>
+                </a:defRPr>
+              </a:lvl9pPr>
+            </a:lstStyle>
+            <a:p>
+              <a:pPr algn="ctr"/>
+              <a:r>
+                <a:rPr lang="de-DE" sz="1000" b="1" dirty="0" smtClean="0">
+                  <a:solidFill>
+                    <a:schemeClr val="tx1"/>
+                  </a:solidFill>
+                  <a:latin typeface="Arial" panose="020B0604020202020204" pitchFamily="34" charset="0"/>
+                  <a:cs typeface="Arial" panose="020B0604020202020204" pitchFamily="34" charset="0"/>
+                </a:rPr>
+                <a:t>AWS</a:t>
+              </a:r>
+            </a:p>
+            <a:p>
+              <a:pPr algn="ctr"/>
+              <a:r>
+                <a:rPr lang="de-DE" sz="1000" b="1" dirty="0" smtClean="0">
+                  <a:solidFill>
+                    <a:schemeClr val="tx1"/>
+                  </a:solidFill>
+                  <a:latin typeface="Arial" panose="020B0604020202020204" pitchFamily="34" charset="0"/>
+                  <a:cs typeface="Arial" panose="020B0604020202020204" pitchFamily="34" charset="0"/>
+                </a:rPr>
+                <a:t>Service</a:t>
+              </a:r>
+            </a:p>
+            <a:p>
+              <a:pPr algn="ctr"/>
+              <a:r>
+                <a:rPr lang="de-DE" sz="1000" b="1" dirty="0" smtClean="0">
+                  <a:solidFill>
+                    <a:schemeClr val="tx1"/>
+                  </a:solidFill>
+                  <a:latin typeface="Arial" panose="020B0604020202020204" pitchFamily="34" charset="0"/>
+                  <a:cs typeface="Arial" panose="020B0604020202020204" pitchFamily="34" charset="0"/>
+                </a:rPr>
+                <a:t>Controller</a:t>
+              </a:r>
+              <a:endParaRPr lang="de-DE" sz="1000" b="1" dirty="0">
+                <a:solidFill>
+                  <a:schemeClr val="tx1"/>
+                </a:solidFill>
+                <a:latin typeface="Arial" panose="020B0604020202020204" pitchFamily="34" charset="0"/>
+                <a:cs typeface="Arial" panose="020B0604020202020204" pitchFamily="34" charset="0"/>
+              </a:endParaRPr>
+            </a:p>
+          </p:txBody>
+        </p:sp>
+        <p:sp>
+          <p:nvSpPr>
+            <p:cNvPr id="35" name="TextBox 19"/>
+            <p:cNvSpPr txBox="1"/>
+            <p:nvPr/>
+          </p:nvSpPr>
+          <p:spPr>
+            <a:xfrm>
+              <a:off x="1120552" y="2411760"/>
+              <a:ext cx="756084" cy="246221"/>
+            </a:xfrm>
+            <a:prstGeom prst="rect">
+              <a:avLst/>
+            </a:prstGeom>
+            <a:noFill/>
+          </p:spPr>
+          <p:txBody>
+            <a:bodyPr wrap="square" rtlCol="0">
+              <a:spAutoFit/>
+            </a:bodyPr>
+            <a:lstStyle>
+              <a:defPPr>
+                <a:defRPr lang="de-DE"/>
+              </a:defPPr>
+              <a:lvl1pPr marL="0" algn="l" defTabSz="914400" rtl="0" eaLnBrk="1" latinLnBrk="0" hangingPunct="1">
+                <a:defRPr sz="1800" kern="1200">
+                  <a:solidFill>
+                    <a:schemeClr val="tx1"/>
+                  </a:solidFill>
+                  <a:latin typeface="+mn-lt"/>
+                  <a:ea typeface="+mn-ea"/>
+                  <a:cs typeface="+mn-cs"/>
+                </a:defRPr>
+              </a:lvl1pPr>
+              <a:lvl2pPr marL="457200" algn="l" defTabSz="914400" rtl="0" eaLnBrk="1" latinLnBrk="0" hangingPunct="1">
+                <a:defRPr sz="1800" kern="1200">
+                  <a:solidFill>
+                    <a:schemeClr val="tx1"/>
+                  </a:solidFill>
+                  <a:latin typeface="+mn-lt"/>
+                  <a:ea typeface="+mn-ea"/>
+                  <a:cs typeface="+mn-cs"/>
+                </a:defRPr>
+              </a:lvl2pPr>
+              <a:lvl3pPr marL="914400" algn="l" defTabSz="914400" rtl="0" eaLnBrk="1" latinLnBrk="0" hangingPunct="1">
+                <a:defRPr sz="1800" kern="1200">
+                  <a:solidFill>
+                    <a:schemeClr val="tx1"/>
+                  </a:solidFill>
+                  <a:latin typeface="+mn-lt"/>
+                  <a:ea typeface="+mn-ea"/>
+                  <a:cs typeface="+mn-cs"/>
+                </a:defRPr>
+              </a:lvl3pPr>
+              <a:lvl4pPr marL="1371600" algn="l" defTabSz="914400" rtl="0" eaLnBrk="1" latinLnBrk="0" hangingPunct="1">
+                <a:defRPr sz="1800" kern="1200">
+                  <a:solidFill>
+                    <a:schemeClr val="tx1"/>
+                  </a:solidFill>
+                  <a:latin typeface="+mn-lt"/>
+                  <a:ea typeface="+mn-ea"/>
+                  <a:cs typeface="+mn-cs"/>
+                </a:defRPr>
+              </a:lvl4pPr>
+              <a:lvl5pPr marL="1828800" algn="l" defTabSz="914400" rtl="0" eaLnBrk="1" latinLnBrk="0" hangingPunct="1">
+                <a:defRPr sz="1800" kern="1200">
+                  <a:solidFill>
+                    <a:schemeClr val="tx1"/>
+                  </a:solidFill>
+                  <a:latin typeface="+mn-lt"/>
+                  <a:ea typeface="+mn-ea"/>
+                  <a:cs typeface="+mn-cs"/>
+                </a:defRPr>
+              </a:lvl5pPr>
+              <a:lvl6pPr marL="2286000" algn="l" defTabSz="914400" rtl="0" eaLnBrk="1" latinLnBrk="0" hangingPunct="1">
+                <a:defRPr sz="1800" kern="1200">
+                  <a:solidFill>
+                    <a:schemeClr val="tx1"/>
+                  </a:solidFill>
+                  <a:latin typeface="+mn-lt"/>
+                  <a:ea typeface="+mn-ea"/>
+                  <a:cs typeface="+mn-cs"/>
+                </a:defRPr>
+              </a:lvl6pPr>
+              <a:lvl7pPr marL="2743200" algn="l" defTabSz="914400" rtl="0" eaLnBrk="1" latinLnBrk="0" hangingPunct="1">
+                <a:defRPr sz="1800" kern="1200">
+                  <a:solidFill>
+                    <a:schemeClr val="tx1"/>
+                  </a:solidFill>
+                  <a:latin typeface="+mn-lt"/>
+                  <a:ea typeface="+mn-ea"/>
+                  <a:cs typeface="+mn-cs"/>
+                </a:defRPr>
+              </a:lvl7pPr>
+              <a:lvl8pPr marL="3200400" algn="l" defTabSz="914400" rtl="0" eaLnBrk="1" latinLnBrk="0" hangingPunct="1">
+                <a:defRPr sz="1800" kern="1200">
+                  <a:solidFill>
+                    <a:schemeClr val="tx1"/>
+                  </a:solidFill>
+                  <a:latin typeface="+mn-lt"/>
+                  <a:ea typeface="+mn-ea"/>
+                  <a:cs typeface="+mn-cs"/>
+                </a:defRPr>
+              </a:lvl8pPr>
+              <a:lvl9pPr marL="3657600" algn="l" defTabSz="914400" rtl="0" eaLnBrk="1" latinLnBrk="0" hangingPunct="1">
+                <a:defRPr sz="1800" kern="1200">
+                  <a:solidFill>
+                    <a:schemeClr val="tx1"/>
+                  </a:solidFill>
+                  <a:latin typeface="+mn-lt"/>
+                  <a:ea typeface="+mn-ea"/>
+                  <a:cs typeface="+mn-cs"/>
+                </a:defRPr>
+              </a:lvl9pPr>
+            </a:lstStyle>
+            <a:p>
+              <a:r>
+                <a:rPr lang="de-DE" sz="1000" b="1" dirty="0" smtClean="0">
+                  <a:latin typeface="Arial" panose="020B0604020202020204" pitchFamily="34" charset="0"/>
+                  <a:cs typeface="Arial" panose="020B0604020202020204" pitchFamily="34" charset="0"/>
+                </a:rPr>
+                <a:t>Platform</a:t>
+              </a:r>
+              <a:endParaRPr lang="de-DE" sz="1000" b="1" dirty="0">
+                <a:latin typeface="Arial" panose="020B0604020202020204" pitchFamily="34" charset="0"/>
+                <a:cs typeface="Arial" panose="020B0604020202020204" pitchFamily="34" charset="0"/>
+              </a:endParaRPr>
+            </a:p>
+          </p:txBody>
+        </p:sp>
+        <p:sp>
+          <p:nvSpPr>
+            <p:cNvPr id="36" name="TextBox 20"/>
+            <p:cNvSpPr txBox="1"/>
+            <p:nvPr/>
+          </p:nvSpPr>
+          <p:spPr>
+            <a:xfrm>
+              <a:off x="2236676" y="2123728"/>
+              <a:ext cx="1278272" cy="553998"/>
+            </a:xfrm>
+            <a:prstGeom prst="rect">
+              <a:avLst/>
+            </a:prstGeom>
+            <a:noFill/>
+          </p:spPr>
+          <p:txBody>
+            <a:bodyPr wrap="square" rtlCol="0">
+              <a:spAutoFit/>
+            </a:bodyPr>
+            <a:lstStyle>
+              <a:defPPr>
+                <a:defRPr lang="de-DE"/>
+              </a:defPPr>
+              <a:lvl1pPr marL="0" algn="l" defTabSz="914400" rtl="0" eaLnBrk="1" latinLnBrk="0" hangingPunct="1">
+                <a:defRPr sz="1800" kern="1200">
+                  <a:solidFill>
+                    <a:schemeClr val="tx1"/>
+                  </a:solidFill>
+                  <a:latin typeface="+mn-lt"/>
+                  <a:ea typeface="+mn-ea"/>
+                  <a:cs typeface="+mn-cs"/>
+                </a:defRPr>
+              </a:lvl1pPr>
+              <a:lvl2pPr marL="457200" algn="l" defTabSz="914400" rtl="0" eaLnBrk="1" latinLnBrk="0" hangingPunct="1">
+                <a:defRPr sz="1800" kern="1200">
+                  <a:solidFill>
+                    <a:schemeClr val="tx1"/>
+                  </a:solidFill>
+                  <a:latin typeface="+mn-lt"/>
+                  <a:ea typeface="+mn-ea"/>
+                  <a:cs typeface="+mn-cs"/>
+                </a:defRPr>
+              </a:lvl2pPr>
+              <a:lvl3pPr marL="914400" algn="l" defTabSz="914400" rtl="0" eaLnBrk="1" latinLnBrk="0" hangingPunct="1">
+                <a:defRPr sz="1800" kern="1200">
+                  <a:solidFill>
+                    <a:schemeClr val="tx1"/>
+                  </a:solidFill>
+                  <a:latin typeface="+mn-lt"/>
+                  <a:ea typeface="+mn-ea"/>
+                  <a:cs typeface="+mn-cs"/>
+                </a:defRPr>
+              </a:lvl3pPr>
+              <a:lvl4pPr marL="1371600" algn="l" defTabSz="914400" rtl="0" eaLnBrk="1" latinLnBrk="0" hangingPunct="1">
+                <a:defRPr sz="1800" kern="1200">
+                  <a:solidFill>
+                    <a:schemeClr val="tx1"/>
+                  </a:solidFill>
+                  <a:latin typeface="+mn-lt"/>
+                  <a:ea typeface="+mn-ea"/>
+                  <a:cs typeface="+mn-cs"/>
+                </a:defRPr>
+              </a:lvl4pPr>
+              <a:lvl5pPr marL="1828800" algn="l" defTabSz="914400" rtl="0" eaLnBrk="1" latinLnBrk="0" hangingPunct="1">
+                <a:defRPr sz="1800" kern="1200">
+                  <a:solidFill>
+                    <a:schemeClr val="tx1"/>
+                  </a:solidFill>
+                  <a:latin typeface="+mn-lt"/>
+                  <a:ea typeface="+mn-ea"/>
+                  <a:cs typeface="+mn-cs"/>
+                </a:defRPr>
+              </a:lvl5pPr>
+              <a:lvl6pPr marL="2286000" algn="l" defTabSz="914400" rtl="0" eaLnBrk="1" latinLnBrk="0" hangingPunct="1">
+                <a:defRPr sz="1800" kern="1200">
+                  <a:solidFill>
+                    <a:schemeClr val="tx1"/>
+                  </a:solidFill>
+                  <a:latin typeface="+mn-lt"/>
+                  <a:ea typeface="+mn-ea"/>
+                  <a:cs typeface="+mn-cs"/>
+                </a:defRPr>
+              </a:lvl6pPr>
+              <a:lvl7pPr marL="2743200" algn="l" defTabSz="914400" rtl="0" eaLnBrk="1" latinLnBrk="0" hangingPunct="1">
+                <a:defRPr sz="1800" kern="1200">
+                  <a:solidFill>
+                    <a:schemeClr val="tx1"/>
+                  </a:solidFill>
+                  <a:latin typeface="+mn-lt"/>
+                  <a:ea typeface="+mn-ea"/>
+                  <a:cs typeface="+mn-cs"/>
+                </a:defRPr>
+              </a:lvl7pPr>
+              <a:lvl8pPr marL="3200400" algn="l" defTabSz="914400" rtl="0" eaLnBrk="1" latinLnBrk="0" hangingPunct="1">
+                <a:defRPr sz="1800" kern="1200">
+                  <a:solidFill>
+                    <a:schemeClr val="tx1"/>
+                  </a:solidFill>
+                  <a:latin typeface="+mn-lt"/>
+                  <a:ea typeface="+mn-ea"/>
+                  <a:cs typeface="+mn-cs"/>
+                </a:defRPr>
+              </a:lvl8pPr>
+              <a:lvl9pPr marL="3657600" algn="l" defTabSz="914400" rtl="0" eaLnBrk="1" latinLnBrk="0" hangingPunct="1">
+                <a:defRPr sz="1800" kern="1200">
+                  <a:solidFill>
+                    <a:schemeClr val="tx1"/>
+                  </a:solidFill>
+                  <a:latin typeface="+mn-lt"/>
+                  <a:ea typeface="+mn-ea"/>
+                  <a:cs typeface="+mn-cs"/>
+                </a:defRPr>
+              </a:lvl9pPr>
+            </a:lstStyle>
+            <a:p>
+              <a:pPr algn="ctr"/>
+              <a:r>
+                <a:rPr lang="de-DE" sz="1000" b="1" dirty="0" smtClean="0">
+                  <a:latin typeface="Arial" panose="020B0604020202020204" pitchFamily="34" charset="0"/>
+                  <a:cs typeface="Arial" panose="020B0604020202020204" pitchFamily="34" charset="0"/>
+                </a:rPr>
+                <a:t>Asynchronous</a:t>
+              </a:r>
+            </a:p>
+            <a:p>
+              <a:pPr algn="ctr"/>
+              <a:r>
+                <a:rPr lang="de-DE" sz="1000" b="1" dirty="0" smtClean="0">
+                  <a:latin typeface="Arial" panose="020B0604020202020204" pitchFamily="34" charset="0"/>
+                  <a:cs typeface="Arial" panose="020B0604020202020204" pitchFamily="34" charset="0"/>
+                </a:rPr>
+                <a:t>Provisioning</a:t>
+              </a:r>
+            </a:p>
+            <a:p>
+              <a:pPr algn="ctr"/>
+              <a:r>
+                <a:rPr lang="de-DE" sz="1000" b="1" dirty="0" smtClean="0">
+                  <a:latin typeface="Arial" panose="020B0604020202020204" pitchFamily="34" charset="0"/>
+                  <a:cs typeface="Arial" panose="020B0604020202020204" pitchFamily="34" charset="0"/>
+                </a:rPr>
+                <a:t>Platform (APP)</a:t>
+              </a:r>
+              <a:endParaRPr lang="de-DE" sz="1000" b="1" dirty="0">
+                <a:latin typeface="Arial" panose="020B0604020202020204" pitchFamily="34" charset="0"/>
+                <a:cs typeface="Arial" panose="020B0604020202020204" pitchFamily="34" charset="0"/>
+              </a:endParaRPr>
+            </a:p>
+          </p:txBody>
+        </p:sp>
+        <p:cxnSp>
+          <p:nvCxnSpPr>
+            <p:cNvPr id="37" name="Straight Arrow Connector 36"/>
+            <p:cNvCxnSpPr>
+              <a:stCxn id="25" idx="3"/>
+              <a:endCxn id="34" idx="1"/>
+            </p:cNvCxnSpPr>
+            <p:nvPr/>
+          </p:nvCxnSpPr>
+          <p:spPr>
+            <a:xfrm>
+              <a:off x="1948644" y="1609068"/>
+              <a:ext cx="448568" cy="7380"/>
+            </a:xfrm>
+            <a:prstGeom prst="straightConnector1">
+              <a:avLst/>
+            </a:prstGeom>
+            <a:ln w="19050">
+              <a:solidFill>
+                <a:srgbClr val="C00000"/>
+              </a:solidFill>
+              <a:tailEnd type="arrow"/>
+            </a:ln>
+          </p:spPr>
+          <p:style>
+            <a:lnRef idx="1">
+              <a:schemeClr val="accent1"/>
+            </a:lnRef>
+            <a:fillRef idx="0">
+              <a:schemeClr val="accent1"/>
+            </a:fillRef>
+            <a:effectRef idx="0">
+              <a:schemeClr val="accent1"/>
+            </a:effectRef>
+            <a:fontRef idx="minor">
+              <a:schemeClr val="tx1"/>
+            </a:fontRef>
+          </p:style>
+        </p:cxnSp>
+        <p:cxnSp>
+          <p:nvCxnSpPr>
+            <p:cNvPr id="38" name="Straight Arrow Connector 37"/>
+            <p:cNvCxnSpPr/>
+            <p:nvPr/>
+          </p:nvCxnSpPr>
+          <p:spPr>
+            <a:xfrm flipH="1">
+              <a:off x="1707753" y="2423810"/>
+              <a:ext cx="689459" cy="0"/>
+            </a:xfrm>
+            <a:prstGeom prst="straightConnector1">
+              <a:avLst/>
+            </a:prstGeom>
+            <a:ln w="19050">
+              <a:solidFill>
+                <a:srgbClr val="C00000"/>
+              </a:solidFill>
+              <a:tailEnd type="arrow"/>
+            </a:ln>
+          </p:spPr>
+          <p:style>
+            <a:lnRef idx="1">
+              <a:schemeClr val="accent1"/>
+            </a:lnRef>
+            <a:fillRef idx="0">
+              <a:schemeClr val="accent1"/>
+            </a:fillRef>
+            <a:effectRef idx="0">
+              <a:schemeClr val="accent1"/>
+            </a:effectRef>
+            <a:fontRef idx="minor">
+              <a:schemeClr val="tx1"/>
+            </a:fontRef>
+          </p:style>
+        </p:cxnSp>
+        <p:cxnSp>
+          <p:nvCxnSpPr>
+            <p:cNvPr id="39" name="Straight Arrow Connector 38"/>
+            <p:cNvCxnSpPr>
+              <a:stCxn id="34" idx="3"/>
+            </p:cNvCxnSpPr>
+            <p:nvPr/>
+          </p:nvCxnSpPr>
+          <p:spPr>
+            <a:xfrm>
+              <a:off x="3333316" y="1616448"/>
+              <a:ext cx="491728" cy="10604"/>
+            </a:xfrm>
+            <a:prstGeom prst="straightConnector1">
+              <a:avLst/>
+            </a:prstGeom>
+            <a:ln w="19050">
+              <a:solidFill>
+                <a:srgbClr val="C00000"/>
+              </a:solidFill>
+              <a:tailEnd type="arrow"/>
+            </a:ln>
+          </p:spPr>
+          <p:style>
+            <a:lnRef idx="1">
+              <a:schemeClr val="accent1"/>
+            </a:lnRef>
+            <a:fillRef idx="0">
+              <a:schemeClr val="accent1"/>
+            </a:fillRef>
+            <a:effectRef idx="0">
+              <a:schemeClr val="accent1"/>
+            </a:effectRef>
+            <a:fontRef idx="minor">
+              <a:schemeClr val="tx1"/>
+            </a:fontRef>
+          </p:style>
+        </p:cxnSp>
+        <p:cxnSp>
+          <p:nvCxnSpPr>
+            <p:cNvPr id="40" name="Straight Arrow Connector 39"/>
+            <p:cNvCxnSpPr>
+              <a:stCxn id="19" idx="1"/>
+            </p:cNvCxnSpPr>
+            <p:nvPr/>
+          </p:nvCxnSpPr>
+          <p:spPr>
+            <a:xfrm flipH="1">
+              <a:off x="3333316" y="1758172"/>
+              <a:ext cx="491728" cy="0"/>
+            </a:xfrm>
+            <a:prstGeom prst="straightConnector1">
+              <a:avLst/>
+            </a:prstGeom>
+            <a:ln w="19050">
+              <a:solidFill>
+                <a:schemeClr val="tx2"/>
+              </a:solidFill>
+              <a:tailEnd type="arrow"/>
+            </a:ln>
+          </p:spPr>
+          <p:style>
+            <a:lnRef idx="1">
+              <a:schemeClr val="accent1"/>
+            </a:lnRef>
+            <a:fillRef idx="0">
+              <a:schemeClr val="accent1"/>
+            </a:fillRef>
+            <a:effectRef idx="0">
+              <a:schemeClr val="accent1"/>
+            </a:effectRef>
+            <a:fontRef idx="minor">
+              <a:schemeClr val="tx1"/>
+            </a:fontRef>
+          </p:style>
+        </p:cxnSp>
+        <p:sp>
+          <p:nvSpPr>
+            <p:cNvPr id="17" name="Rounded Rectangle 16"/>
+            <p:cNvSpPr/>
+            <p:nvPr/>
+          </p:nvSpPr>
+          <p:spPr>
+            <a:xfrm>
+              <a:off x="4293096" y="971600"/>
+              <a:ext cx="1368152" cy="655452"/>
+            </a:xfrm>
+            <a:prstGeom prst="roundRect">
+              <a:avLst/>
+            </a:prstGeom>
+            <a:solidFill>
+              <a:schemeClr val="tx2">
+                <a:lumMod val="20000"/>
+                <a:lumOff val="80000"/>
+              </a:schemeClr>
+            </a:solidFill>
+            <a:ln w="31750"/>
+          </p:spPr>
+          <p:style>
+            <a:lnRef idx="2">
+              <a:schemeClr val="accent1">
+                <a:shade val="50000"/>
+              </a:schemeClr>
+            </a:lnRef>
+            <a:fillRef idx="1">
+              <a:schemeClr val="accent1"/>
+            </a:fillRef>
+            <a:effectRef idx="0">
+              <a:schemeClr val="accent1"/>
+            </a:effectRef>
+            <a:fontRef idx="minor">
+              <a:schemeClr val="lt1"/>
+            </a:fontRef>
+          </p:style>
+          <p:txBody>
+            <a:bodyPr rtlCol="0" anchor="ctr"/>
+            <a:lstStyle/>
+            <a:p>
+              <a:pPr algn="ctr"/>
+              <a:r>
+                <a:rPr lang="de-DE" sz="1000" b="1" dirty="0" smtClean="0">
+                  <a:solidFill>
+                    <a:schemeClr val="tx1"/>
+                  </a:solidFill>
+                  <a:latin typeface="Arial" panose="020B0604020202020204" pitchFamily="34" charset="0"/>
+                  <a:cs typeface="Arial" panose="020B0604020202020204" pitchFamily="34" charset="0"/>
+                </a:rPr>
+                <a:t>Amazon Machine</a:t>
+              </a:r>
+            </a:p>
+            <a:p>
+              <a:pPr algn="ctr"/>
+              <a:r>
+                <a:rPr lang="de-DE" sz="1000" b="1" dirty="0" smtClean="0">
+                  <a:solidFill>
+                    <a:schemeClr val="tx1"/>
+                  </a:solidFill>
+                  <a:latin typeface="Arial" panose="020B0604020202020204" pitchFamily="34" charset="0"/>
+                  <a:cs typeface="Arial" panose="020B0604020202020204" pitchFamily="34" charset="0"/>
+                </a:rPr>
+                <a:t>Images (AMIs)</a:t>
+              </a:r>
+              <a:endParaRPr lang="de-DE" sz="1000" b="1" dirty="0">
+                <a:solidFill>
+                  <a:schemeClr val="tx1"/>
+                </a:solidFill>
+                <a:latin typeface="Arial" panose="020B0604020202020204" pitchFamily="34" charset="0"/>
+                <a:cs typeface="Arial" panose="020B0604020202020204" pitchFamily="34" charset="0"/>
+              </a:endParaRPr>
+            </a:p>
+          </p:txBody>
+        </p:sp>
+        <p:sp>
+          <p:nvSpPr>
+            <p:cNvPr id="20" name="Rounded Rectangle 19"/>
+            <p:cNvSpPr/>
+            <p:nvPr/>
+          </p:nvSpPr>
+          <p:spPr>
+            <a:xfrm>
+              <a:off x="4037906" y="1979712"/>
+              <a:ext cx="1911374" cy="792088"/>
+            </a:xfrm>
+            <a:prstGeom prst="roundRect">
+              <a:avLst/>
+            </a:prstGeom>
+            <a:solidFill>
+              <a:schemeClr val="tx2">
+                <a:lumMod val="20000"/>
+                <a:lumOff val="80000"/>
+              </a:schemeClr>
+            </a:solidFill>
+            <a:ln w="31750"/>
+          </p:spPr>
+          <p:style>
+            <a:lnRef idx="2">
+              <a:schemeClr val="accent1">
+                <a:shade val="50000"/>
+              </a:schemeClr>
+            </a:lnRef>
+            <a:fillRef idx="1">
+              <a:schemeClr val="accent1"/>
+            </a:fillRef>
+            <a:effectRef idx="0">
+              <a:schemeClr val="accent1"/>
+            </a:effectRef>
+            <a:fontRef idx="minor">
+              <a:schemeClr val="lt1"/>
+            </a:fontRef>
+          </p:style>
+          <p:txBody>
+            <a:bodyPr rtlCol="0" anchor="ctr"/>
+            <a:lstStyle/>
+            <a:p>
+              <a:pPr algn="ctr"/>
+              <a:r>
+                <a:rPr lang="de-DE" sz="1000" b="1" dirty="0">
+                  <a:solidFill>
+                    <a:schemeClr val="tx1"/>
+                  </a:solidFill>
+                  <a:latin typeface="Arial" panose="020B0604020202020204" pitchFamily="34" charset="0"/>
+                  <a:cs typeface="Arial" panose="020B0604020202020204" pitchFamily="34" charset="0"/>
+                </a:rPr>
+                <a:t>Amazon EC2</a:t>
+              </a:r>
+            </a:p>
+            <a:p>
+              <a:pPr algn="ctr"/>
+              <a:r>
+                <a:rPr lang="de-DE" sz="1000" b="1" dirty="0">
+                  <a:solidFill>
+                    <a:schemeClr val="tx1"/>
+                  </a:solidFill>
+                  <a:latin typeface="Arial" panose="020B0604020202020204" pitchFamily="34" charset="0"/>
+                  <a:cs typeface="Arial" panose="020B0604020202020204" pitchFamily="34" charset="0"/>
+                </a:rPr>
+                <a:t>instances</a:t>
+              </a:r>
+            </a:p>
+          </p:txBody>
+        </p:sp>
+        <p:cxnSp>
+          <p:nvCxnSpPr>
+            <p:cNvPr id="21" name="Straight Arrow Connector 20"/>
+            <p:cNvCxnSpPr/>
+            <p:nvPr/>
+          </p:nvCxnSpPr>
+          <p:spPr>
+            <a:xfrm>
+              <a:off x="5013176" y="1645072"/>
+              <a:ext cx="0" cy="334640"/>
+            </a:xfrm>
+            <a:prstGeom prst="straightConnector1">
+              <a:avLst/>
+            </a:prstGeom>
+            <a:ln w="19050">
+              <a:solidFill>
+                <a:schemeClr val="tx2"/>
+              </a:solidFill>
+              <a:tailEnd type="arrow"/>
+            </a:ln>
+          </p:spPr>
+          <p:style>
+            <a:lnRef idx="1">
+              <a:schemeClr val="accent1"/>
+            </a:lnRef>
+            <a:fillRef idx="0">
+              <a:schemeClr val="accent1"/>
+            </a:fillRef>
+            <a:effectRef idx="0">
+              <a:schemeClr val="accent1"/>
+            </a:effectRef>
+            <a:fontRef idx="minor">
+              <a:schemeClr val="tx1"/>
+            </a:fontRef>
+          </p:style>
+        </p:cxnSp>
+      </p:grpSp>
+    </p:spTree>
+    <p:extLst>
+      <p:ext uri="{BB962C8B-B14F-4D97-AF65-F5344CB8AC3E}">
+        <p14:creationId xmlns:p14="http://schemas.microsoft.com/office/powerpoint/2010/main" val="545745481"/>
       </p:ext>
     </p:extLst>
   </p:cSld>

</xml_diff>